<commit_message>
stupid vs smart AI
</commit_message>
<xml_diff>
--- a/WhatIsArtificialIntelligence.pptx
+++ b/WhatIsArtificialIntelligence.pptx
@@ -5,7 +5,7 @@
     <p:sldMasterId id="2147483648" r:id="rId1"/>
   </p:sldMasterIdLst>
   <p:notesMasterIdLst>
-    <p:notesMasterId r:id="rId7"/>
+    <p:notesMasterId r:id="rId8"/>
   </p:notesMasterIdLst>
   <p:sldIdLst>
     <p:sldId id="257" r:id="rId2"/>
@@ -13,6 +13,7 @@
     <p:sldId id="331" r:id="rId4"/>
     <p:sldId id="332" r:id="rId5"/>
     <p:sldId id="261" r:id="rId6"/>
+    <p:sldId id="260" r:id="rId7"/>
   </p:sldIdLst>
   <p:sldSz cx="12192000" cy="6858000"/>
   <p:notesSz cx="6858000" cy="9144000"/>
@@ -726,6 +727,123 @@
     <p:extLst>
       <p:ext uri="{BB962C8B-B14F-4D97-AF65-F5344CB8AC3E}">
         <p14:creationId xmlns:p14="http://schemas.microsoft.com/office/powerpoint/2010/main" val="1441815743"/>
+      </p:ext>
+    </p:extLst>
+  </p:cSld>
+  <p:clrMapOvr>
+    <a:masterClrMapping/>
+  </p:clrMapOvr>
+</p:notes>
+</file>
+
+<file path=ppt/notesSlides/notesSlide4.xml><?xml version="1.0" encoding="utf-8"?>
+<p:notes xmlns:a="http://schemas.openxmlformats.org/drawingml/2006/main" xmlns:r="http://schemas.openxmlformats.org/officeDocument/2006/relationships" xmlns:p="http://schemas.openxmlformats.org/presentationml/2006/main">
+  <p:cSld>
+    <p:spTree>
+      <p:nvGrpSpPr>
+        <p:cNvPr id="1" name=""/>
+        <p:cNvGrpSpPr/>
+        <p:nvPr/>
+      </p:nvGrpSpPr>
+      <p:grpSpPr>
+        <a:xfrm>
+          <a:off x="0" y="0"/>
+          <a:ext cx="0" cy="0"/>
+          <a:chOff x="0" y="0"/>
+          <a:chExt cx="0" cy="0"/>
+        </a:xfrm>
+      </p:grpSpPr>
+      <p:sp>
+        <p:nvSpPr>
+          <p:cNvPr id="2" name="Slide Image Placeholder 1"/>
+          <p:cNvSpPr>
+            <a:spLocks noGrp="1" noRot="1" noChangeAspect="1"/>
+          </p:cNvSpPr>
+          <p:nvPr>
+            <p:ph type="sldImg"/>
+          </p:nvPr>
+        </p:nvSpPr>
+        <p:spPr/>
+      </p:sp>
+      <p:sp>
+        <p:nvSpPr>
+          <p:cNvPr id="3" name="Notes Placeholder 2"/>
+          <p:cNvSpPr>
+            <a:spLocks noGrp="1"/>
+          </p:cNvSpPr>
+          <p:nvPr>
+            <p:ph type="body" idx="1"/>
+          </p:nvPr>
+        </p:nvSpPr>
+        <p:spPr/>
+        <p:txBody>
+          <a:bodyPr/>
+          <a:lstStyle/>
+          <a:p>
+            <a:r>
+              <a:rPr lang="en-US" b="0" dirty="0">
+                <a:solidFill>
+                  <a:srgbClr val="D4D4D4"/>
+                </a:solidFill>
+                <a:effectLst/>
+                <a:latin typeface="Consolas" panose="020B0609020204030204" pitchFamily="49" charset="0"/>
+              </a:rPr>
+              <a:t>When playing video games, if there are multiple levels, the AI is purposefully made "stupid" (to some extend)</a:t>
+            </a:r>
+          </a:p>
+          <a:p>
+            <a:endParaRPr lang="en-US" b="0" dirty="0">
+              <a:solidFill>
+                <a:srgbClr val="D4D4D4"/>
+              </a:solidFill>
+              <a:effectLst/>
+              <a:latin typeface="Consolas" panose="020B0609020204030204" pitchFamily="49" charset="0"/>
+            </a:endParaRPr>
+          </a:p>
+          <a:p>
+            <a:r>
+              <a:rPr lang="en-US" b="0" dirty="0">
+                <a:solidFill>
+                  <a:srgbClr val="D4D4D4"/>
+                </a:solidFill>
+                <a:effectLst/>
+                <a:latin typeface="Consolas" panose="020B0609020204030204" pitchFamily="49" charset="0"/>
+              </a:rPr>
+              <a:t>Today, we will be more interested in the "smart" ones</a:t>
+            </a:r>
+          </a:p>
+          <a:p>
+            <a:endParaRPr lang="en-US" dirty="0"/>
+          </a:p>
+        </p:txBody>
+      </p:sp>
+      <p:sp>
+        <p:nvSpPr>
+          <p:cNvPr id="4" name="Slide Number Placeholder 3"/>
+          <p:cNvSpPr>
+            <a:spLocks noGrp="1"/>
+          </p:cNvSpPr>
+          <p:nvPr>
+            <p:ph type="sldNum" sz="quarter" idx="5"/>
+          </p:nvPr>
+        </p:nvSpPr>
+        <p:spPr/>
+        <p:txBody>
+          <a:bodyPr/>
+          <a:lstStyle/>
+          <a:p>
+            <a:fld id="{CEFB1CB0-8521-448A-8AF4-782A4204CD99}" type="slidenum">
+              <a:rPr lang="en-US" smtClean="0"/>
+              <a:t>6</a:t>
+            </a:fld>
+            <a:endParaRPr lang="en-US"/>
+          </a:p>
+        </p:txBody>
+      </p:sp>
+    </p:spTree>
+    <p:extLst>
+      <p:ext uri="{BB962C8B-B14F-4D97-AF65-F5344CB8AC3E}">
+        <p14:creationId xmlns:p14="http://schemas.microsoft.com/office/powerpoint/2010/main" val="2518621464"/>
       </p:ext>
     </p:extLst>
   </p:cSld>
@@ -5545,6 +5663,187 @@
     <p:extLst>
       <p:ext uri="{BB962C8B-B14F-4D97-AF65-F5344CB8AC3E}">
         <p14:creationId xmlns:p14="http://schemas.microsoft.com/office/powerpoint/2010/main" val="2838456650"/>
+      </p:ext>
+    </p:extLst>
+  </p:cSld>
+  <p:clrMapOvr>
+    <a:masterClrMapping/>
+  </p:clrMapOvr>
+</p:sld>
+</file>
+
+<file path=ppt/slides/slide6.xml><?xml version="1.0" encoding="utf-8"?>
+<p:sld xmlns:a="http://schemas.openxmlformats.org/drawingml/2006/main" xmlns:r="http://schemas.openxmlformats.org/officeDocument/2006/relationships" xmlns:p="http://schemas.openxmlformats.org/presentationml/2006/main">
+  <p:cSld>
+    <p:spTree>
+      <p:nvGrpSpPr>
+        <p:cNvPr id="1" name=""/>
+        <p:cNvGrpSpPr/>
+        <p:nvPr/>
+      </p:nvGrpSpPr>
+      <p:grpSpPr>
+        <a:xfrm>
+          <a:off x="0" y="0"/>
+          <a:ext cx="0" cy="0"/>
+          <a:chOff x="0" y="0"/>
+          <a:chExt cx="0" cy="0"/>
+        </a:xfrm>
+      </p:grpSpPr>
+      <p:sp>
+        <p:nvSpPr>
+          <p:cNvPr id="2" name="Title 1">
+            <a:extLst>
+              <a:ext uri="{FF2B5EF4-FFF2-40B4-BE49-F238E27FC236}">
+                <a16:creationId xmlns:a16="http://schemas.microsoft.com/office/drawing/2014/main" id="{2277B080-C152-9F68-4D72-154640251879}"/>
+              </a:ext>
+            </a:extLst>
+          </p:cNvPr>
+          <p:cNvSpPr>
+            <a:spLocks noGrp="1"/>
+          </p:cNvSpPr>
+          <p:nvPr>
+            <p:ph type="title"/>
+          </p:nvPr>
+        </p:nvSpPr>
+        <p:spPr>
+          <a:xfrm>
+            <a:off x="497973" y="393380"/>
+            <a:ext cx="10313960" cy="739881"/>
+          </a:xfrm>
+        </p:spPr>
+        <p:txBody>
+          <a:bodyPr vert="horz" lIns="91440" tIns="45720" rIns="91440" bIns="45720" rtlCol="0" anchor="b">
+            <a:normAutofit/>
+          </a:bodyPr>
+          <a:lstStyle/>
+          <a:p>
+            <a:r>
+              <a:rPr lang="en-GB" sz="3600" dirty="0"/>
+              <a:t>Not all AIs are "intelligent"</a:t>
+            </a:r>
+            <a:endParaRPr lang="fr-FR" sz="3600" dirty="0"/>
+          </a:p>
+        </p:txBody>
+      </p:sp>
+      <p:pic>
+        <p:nvPicPr>
+          <p:cNvPr id="6" name="Content Placeholder 5">
+            <a:extLst>
+              <a:ext uri="{FF2B5EF4-FFF2-40B4-BE49-F238E27FC236}">
+                <a16:creationId xmlns:a16="http://schemas.microsoft.com/office/drawing/2014/main" id="{D6DE1274-16E4-4C2F-413E-9F886E7D9C75}"/>
+              </a:ext>
+            </a:extLst>
+          </p:cNvPr>
+          <p:cNvPicPr>
+            <a:picLocks noGrp="1" noChangeAspect="1"/>
+          </p:cNvPicPr>
+          <p:nvPr>
+            <p:ph sz="half" idx="1"/>
+          </p:nvPr>
+        </p:nvPicPr>
+        <p:blipFill>
+          <a:blip r:embed="rId3">
+            <a:extLst>
+              <a:ext uri="{28A0092B-C50C-407E-A947-70E740481C1C}">
+                <a14:useLocalDpi xmlns:a14="http://schemas.microsoft.com/office/drawing/2010/main" val="0"/>
+              </a:ext>
+            </a:extLst>
+          </a:blip>
+          <a:srcRect/>
+          <a:stretch/>
+        </p:blipFill>
+        <p:spPr>
+          <a:xfrm>
+            <a:off x="2078943" y="2337520"/>
+            <a:ext cx="3373624" cy="3365190"/>
+          </a:xfrm>
+          <a:prstGeom prst="rect">
+            <a:avLst/>
+          </a:prstGeom>
+        </p:spPr>
+      </p:pic>
+      <p:pic>
+        <p:nvPicPr>
+          <p:cNvPr id="8" name="Content Placeholder 7">
+            <a:extLst>
+              <a:ext uri="{FF2B5EF4-FFF2-40B4-BE49-F238E27FC236}">
+                <a16:creationId xmlns:a16="http://schemas.microsoft.com/office/drawing/2014/main" id="{69DD07EE-5527-08CA-427C-569C3130F663}"/>
+              </a:ext>
+            </a:extLst>
+          </p:cNvPr>
+          <p:cNvPicPr>
+            <a:picLocks noGrp="1" noChangeAspect="1"/>
+          </p:cNvPicPr>
+          <p:nvPr>
+            <p:ph sz="half" idx="2"/>
+          </p:nvPr>
+        </p:nvPicPr>
+        <p:blipFill>
+          <a:blip r:embed="rId4">
+            <a:extLst>
+              <a:ext uri="{28A0092B-C50C-407E-A947-70E740481C1C}">
+                <a14:useLocalDpi xmlns:a14="http://schemas.microsoft.com/office/drawing/2010/main" val="0"/>
+              </a:ext>
+            </a:extLst>
+          </a:blip>
+          <a:srcRect/>
+          <a:stretch/>
+        </p:blipFill>
+        <p:spPr>
+          <a:xfrm>
+            <a:off x="6759099" y="2337520"/>
+            <a:ext cx="3373624" cy="3365190"/>
+          </a:xfrm>
+          <a:prstGeom prst="rect">
+            <a:avLst/>
+          </a:prstGeom>
+        </p:spPr>
+      </p:pic>
+      <p:sp>
+        <p:nvSpPr>
+          <p:cNvPr id="10" name="TextBox 9">
+            <a:extLst>
+              <a:ext uri="{FF2B5EF4-FFF2-40B4-BE49-F238E27FC236}">
+                <a16:creationId xmlns:a16="http://schemas.microsoft.com/office/drawing/2014/main" id="{F210E243-A46F-EA2E-D4F7-A0FCD72E7C30}"/>
+              </a:ext>
+            </a:extLst>
+          </p:cNvPr>
+          <p:cNvSpPr txBox="1"/>
+          <p:nvPr/>
+        </p:nvSpPr>
+        <p:spPr>
+          <a:xfrm>
+            <a:off x="497973" y="1218973"/>
+            <a:ext cx="10771363" cy="954107"/>
+          </a:xfrm>
+          <a:prstGeom prst="rect">
+            <a:avLst/>
+          </a:prstGeom>
+          <a:noFill/>
+        </p:spPr>
+        <p:txBody>
+          <a:bodyPr wrap="square">
+            <a:spAutoFit/>
+          </a:bodyPr>
+          <a:lstStyle/>
+          <a:p>
+            <a:pPr algn="ctr"/>
+            <a:r>
+              <a:rPr lang="en-GB" sz="2800" b="1" i="1" dirty="0"/>
+              <a:t>AI: </a:t>
+            </a:r>
+            <a:r>
+              <a:rPr lang="en-GB" sz="2800" b="1" dirty="0"/>
+              <a:t>"the set of theories and techniques implemented in order to achieve machines capable of simulating human intelligence"</a:t>
+            </a:r>
+            <a:endParaRPr lang="fr-FR" sz="2800" b="1" dirty="0"/>
+          </a:p>
+        </p:txBody>
+      </p:sp>
+    </p:spTree>
+    <p:extLst>
+      <p:ext uri="{BB962C8B-B14F-4D97-AF65-F5344CB8AC3E}">
+        <p14:creationId xmlns:p14="http://schemas.microsoft.com/office/powerpoint/2010/main" val="3416611972"/>
       </p:ext>
     </p:extLst>
   </p:cSld>

</xml_diff>